<commit_message>
Update App Service text re: orchestration
</commit_message>
<xml_diff>
--- a/Whiteboard design session/WDS trainer presentation - Containers and DevOps.pptx
+++ b/Whiteboard design session/WDS trainer presentation - Containers and DevOps.pptx
@@ -220,7 +220,7 @@
           <a:p>
             <a:fld id="{52A13B17-C506-4D51-BB37-16B365906619}" type="datetimeFigureOut">
               <a:rPr lang="en-US" smtClean="0"/>
-              <a:t>4/14/19</a:t>
+              <a:t>9/5/2019</a:t>
             </a:fld>
             <a:endParaRPr lang="en-US"/>
           </a:p>
@@ -1663,8 +1663,29 @@
                 <a:ea typeface="+mn-ea"/>
                 <a:cs typeface="+mn-cs"/>
               </a:rPr>
-              <a:t>The easiest way to move to containers on Azure is to deploy containers to App Service for Containers, however, this option does not provide the typical management tools for container orchestration – that can provide load balancing, dynamic discovery, self-healing, and a holistic approach to container monitoring. </a:t>
-            </a:r>
+              <a:t>The easiest way to move to containers on Azure is to deploy containers to the Linux variant of App Service. </a:t>
+            </a:r>
+            <a:r>
+              <a:rPr lang="en-US" sz="1200" kern="1200">
+                <a:solidFill>
+                  <a:schemeClr val="tx1"/>
+                </a:solidFill>
+                <a:effectLst/>
+                <a:latin typeface="+mn-lt"/>
+                <a:ea typeface="+mn-ea"/>
+                <a:cs typeface="+mn-cs"/>
+              </a:rPr>
+              <a:t>However this option does not provide a full-featured container orchestration platform with highly customizable load balancing, dynamic service discovery, and a holistic approach to container monitoring. </a:t>
+            </a:r>
+            <a:endParaRPr lang="en-US" sz="1200" kern="1200" dirty="0">
+              <a:solidFill>
+                <a:schemeClr val="tx1"/>
+              </a:solidFill>
+              <a:effectLst/>
+              <a:latin typeface="+mn-lt"/>
+              <a:ea typeface="+mn-ea"/>
+              <a:cs typeface="+mn-cs"/>
+            </a:endParaRPr>
           </a:p>
           <a:p>
             <a:r>
@@ -2115,7 +2136,7 @@
                   <a:prstClr val="black"/>
                 </a:solidFill>
               </a:rPr>
-              <a:t>4/14/19 5:58 PM</a:t>
+              <a:t>9/5/2019 5:29 PM</a:t>
             </a:fld>
             <a:endParaRPr lang="en-US" dirty="0">
               <a:solidFill>
@@ -3067,7 +3088,7 @@
       </p:transition>
     </mc:Fallback>
   </mc:AlternateContent>
-  <p:extLst mod="1">
+  <p:extLst>
     <p:ext uri="{DCECCB84-F9BA-43D5-87BE-67443E8EF086}">
       <p15:sldGuideLst xmlns:p15="http://schemas.microsoft.com/office/powerpoint/2012/main">
         <p15:guide id="1" pos="288">
@@ -14073,7 +14094,7 @@
       </a:lvl9pPr>
     </p:otherStyle>
   </p:txStyles>
-  <p:extLst mod="1">
+  <p:extLst>
     <p:ext uri="{27BBF7A9-308A-43DC-89C8-2F10F3537804}">
       <p15:sldGuideLst xmlns:p15="http://schemas.microsoft.com/office/powerpoint/2012/main">
         <p15:guide id="1" orient="horz" pos="187">
@@ -14688,7 +14709,7 @@
       </a:lvl9pPr>
     </p:otherStyle>
   </p:txStyles>
-  <p:extLst mod="1">
+  <p:extLst>
     <p:ext uri="{27BBF7A9-308A-43DC-89C8-2F10F3537804}">
       <p15:sldGuideLst xmlns:p15="http://schemas.microsoft.com/office/powerpoint/2012/main">
         <p15:guide id="1" orient="horz" pos="187">
@@ -17483,7 +17504,7 @@
             <a:pPr lvl="2"/>
             <a:r>
               <a:rPr lang="en-US" sz="2800" dirty="0"/>
-              <a:t>App Service for Containers – simple, PaaS without robust orchestration platform management tooling</a:t>
+              <a:t>App Service for Containers – simple PaaS without full-featured container orchestration</a:t>
             </a:r>
           </a:p>
           <a:p>

</xml_diff>